<commit_message>
Revisions based on reviewer comments.
</commit_message>
<xml_diff>
--- a/papers/logpp/Figures/ArchDiagram.pptx
+++ b/papers/logpp/Figures/ArchDiagram.pptx
@@ -112,10 +112,6 @@
 </p:presentation>
 </file>
 
-<file path=ppt/revisionInfo.xml><?xml version="1.0" encoding="utf-8"?>
-<p1510:revInfo xmlns:a="http://schemas.openxmlformats.org/drawingml/2006/main" xmlns:r="http://schemas.openxmlformats.org/officeDocument/2006/relationships" xmlns:p1510="http://schemas.microsoft.com/office/powerpoint/2015/10/main"/>
-</file>
-
 <file path=ppt/slideLayouts/slideLayout1.xml><?xml version="1.0" encoding="utf-8"?>
 <p:sldLayout xmlns:a="http://schemas.openxmlformats.org/drawingml/2006/main" xmlns:r="http://schemas.openxmlformats.org/officeDocument/2006/relationships" xmlns:p="http://schemas.openxmlformats.org/presentationml/2006/main" type="title" preserve="1">
   <p:cSld name="Title Slide">
@@ -263,7 +259,7 @@
           <a:p>
             <a:fld id="{9D1BA642-AC89-4F3E-BA2B-F8B26D5631CC}" type="datetimeFigureOut">
               <a:rPr lang="en-US" smtClean="0"/>
-              <a:t>6/29/2018</a:t>
+              <a:t>8/15/2018</a:t>
             </a:fld>
             <a:endParaRPr lang="en-US"/>
           </a:p>
@@ -461,7 +457,7 @@
           <a:p>
             <a:fld id="{9D1BA642-AC89-4F3E-BA2B-F8B26D5631CC}" type="datetimeFigureOut">
               <a:rPr lang="en-US" smtClean="0"/>
-              <a:t>6/29/2018</a:t>
+              <a:t>8/15/2018</a:t>
             </a:fld>
             <a:endParaRPr lang="en-US"/>
           </a:p>
@@ -669,7 +665,7 @@
           <a:p>
             <a:fld id="{9D1BA642-AC89-4F3E-BA2B-F8B26D5631CC}" type="datetimeFigureOut">
               <a:rPr lang="en-US" smtClean="0"/>
-              <a:t>6/29/2018</a:t>
+              <a:t>8/15/2018</a:t>
             </a:fld>
             <a:endParaRPr lang="en-US"/>
           </a:p>
@@ -867,7 +863,7 @@
           <a:p>
             <a:fld id="{9D1BA642-AC89-4F3E-BA2B-F8B26D5631CC}" type="datetimeFigureOut">
               <a:rPr lang="en-US" smtClean="0"/>
-              <a:t>6/29/2018</a:t>
+              <a:t>8/15/2018</a:t>
             </a:fld>
             <a:endParaRPr lang="en-US"/>
           </a:p>
@@ -1142,7 +1138,7 @@
           <a:p>
             <a:fld id="{9D1BA642-AC89-4F3E-BA2B-F8B26D5631CC}" type="datetimeFigureOut">
               <a:rPr lang="en-US" smtClean="0"/>
-              <a:t>6/29/2018</a:t>
+              <a:t>8/15/2018</a:t>
             </a:fld>
             <a:endParaRPr lang="en-US"/>
           </a:p>
@@ -1407,7 +1403,7 @@
           <a:p>
             <a:fld id="{9D1BA642-AC89-4F3E-BA2B-F8B26D5631CC}" type="datetimeFigureOut">
               <a:rPr lang="en-US" smtClean="0"/>
-              <a:t>6/29/2018</a:t>
+              <a:t>8/15/2018</a:t>
             </a:fld>
             <a:endParaRPr lang="en-US"/>
           </a:p>
@@ -1819,7 +1815,7 @@
           <a:p>
             <a:fld id="{9D1BA642-AC89-4F3E-BA2B-F8B26D5631CC}" type="datetimeFigureOut">
               <a:rPr lang="en-US" smtClean="0"/>
-              <a:t>6/29/2018</a:t>
+              <a:t>8/15/2018</a:t>
             </a:fld>
             <a:endParaRPr lang="en-US"/>
           </a:p>
@@ -1960,7 +1956,7 @@
           <a:p>
             <a:fld id="{9D1BA642-AC89-4F3E-BA2B-F8B26D5631CC}" type="datetimeFigureOut">
               <a:rPr lang="en-US" smtClean="0"/>
-              <a:t>6/29/2018</a:t>
+              <a:t>8/15/2018</a:t>
             </a:fld>
             <a:endParaRPr lang="en-US"/>
           </a:p>
@@ -2073,7 +2069,7 @@
           <a:p>
             <a:fld id="{9D1BA642-AC89-4F3E-BA2B-F8B26D5631CC}" type="datetimeFigureOut">
               <a:rPr lang="en-US" smtClean="0"/>
-              <a:t>6/29/2018</a:t>
+              <a:t>8/15/2018</a:t>
             </a:fld>
             <a:endParaRPr lang="en-US"/>
           </a:p>
@@ -2384,7 +2380,7 @@
           <a:p>
             <a:fld id="{9D1BA642-AC89-4F3E-BA2B-F8B26D5631CC}" type="datetimeFigureOut">
               <a:rPr lang="en-US" smtClean="0"/>
-              <a:t>6/29/2018</a:t>
+              <a:t>8/15/2018</a:t>
             </a:fld>
             <a:endParaRPr lang="en-US"/>
           </a:p>
@@ -2672,7 +2668,7 @@
           <a:p>
             <a:fld id="{9D1BA642-AC89-4F3E-BA2B-F8B26D5631CC}" type="datetimeFigureOut">
               <a:rPr lang="en-US" smtClean="0"/>
-              <a:t>6/29/2018</a:t>
+              <a:t>8/15/2018</a:t>
             </a:fld>
             <a:endParaRPr lang="en-US"/>
           </a:p>
@@ -2913,7 +2909,7 @@
           <a:p>
             <a:fld id="{9D1BA642-AC89-4F3E-BA2B-F8B26D5631CC}" type="datetimeFigureOut">
               <a:rPr lang="en-US" smtClean="0"/>
-              <a:t>6/29/2018</a:t>
+              <a:t>8/15/2018</a:t>
             </a:fld>
             <a:endParaRPr lang="en-US"/>
           </a:p>
@@ -3361,7 +3357,7 @@
             <a:pPr algn="ctr"/>
             <a:r>
               <a:rPr lang="en-US" sz="2000" dirty="0"/>
-              <a:t>in-memory buffer</a:t>
+              <a:t>In-memory buffer</a:t>
             </a:r>
           </a:p>
         </p:txBody>
@@ -4014,8 +4010,8 @@
           <a:p>
             <a:pPr algn="ctr"/>
             <a:r>
-              <a:rPr lang="en-US" sz="2000" dirty="0" err="1"/>
-              <a:t>Trasnport</a:t>
+              <a:rPr lang="en-US" sz="2000"/>
+              <a:t>Transport</a:t>
             </a:r>
             <a:endParaRPr lang="en-US" sz="2000" dirty="0"/>
           </a:p>
@@ -5649,8 +5645,8 @@
         </p:nvSpPr>
         <p:spPr>
           <a:xfrm>
-            <a:off x="6310159" y="5507017"/>
-            <a:ext cx="2255939" cy="400110"/>
+            <a:off x="6302946" y="5507017"/>
+            <a:ext cx="2270365" cy="400110"/>
           </a:xfrm>
           <a:prstGeom prst="rect">
             <a:avLst/>
@@ -5665,7 +5661,7 @@
             <a:pPr algn="ctr"/>
             <a:r>
               <a:rPr lang="en-US" sz="2000" dirty="0"/>
-              <a:t>message processing</a:t>
+              <a:t>Message processing</a:t>
             </a:r>
           </a:p>
         </p:txBody>

</xml_diff>

<commit_message>
last bits of cleanup
</commit_message>
<xml_diff>
--- a/papers/logpp/Figures/ArchDiagram.pptx
+++ b/papers/logpp/Figures/ArchDiagram.pptx
@@ -259,7 +259,7 @@
           <a:p>
             <a:fld id="{9D1BA642-AC89-4F3E-BA2B-F8B26D5631CC}" type="datetimeFigureOut">
               <a:rPr lang="en-US" smtClean="0"/>
-              <a:t>8/15/2018</a:t>
+              <a:t>8/29/2018</a:t>
             </a:fld>
             <a:endParaRPr lang="en-US"/>
           </a:p>
@@ -457,7 +457,7 @@
           <a:p>
             <a:fld id="{9D1BA642-AC89-4F3E-BA2B-F8B26D5631CC}" type="datetimeFigureOut">
               <a:rPr lang="en-US" smtClean="0"/>
-              <a:t>8/15/2018</a:t>
+              <a:t>8/29/2018</a:t>
             </a:fld>
             <a:endParaRPr lang="en-US"/>
           </a:p>
@@ -665,7 +665,7 @@
           <a:p>
             <a:fld id="{9D1BA642-AC89-4F3E-BA2B-F8B26D5631CC}" type="datetimeFigureOut">
               <a:rPr lang="en-US" smtClean="0"/>
-              <a:t>8/15/2018</a:t>
+              <a:t>8/29/2018</a:t>
             </a:fld>
             <a:endParaRPr lang="en-US"/>
           </a:p>
@@ -863,7 +863,7 @@
           <a:p>
             <a:fld id="{9D1BA642-AC89-4F3E-BA2B-F8B26D5631CC}" type="datetimeFigureOut">
               <a:rPr lang="en-US" smtClean="0"/>
-              <a:t>8/15/2018</a:t>
+              <a:t>8/29/2018</a:t>
             </a:fld>
             <a:endParaRPr lang="en-US"/>
           </a:p>
@@ -1138,7 +1138,7 @@
           <a:p>
             <a:fld id="{9D1BA642-AC89-4F3E-BA2B-F8B26D5631CC}" type="datetimeFigureOut">
               <a:rPr lang="en-US" smtClean="0"/>
-              <a:t>8/15/2018</a:t>
+              <a:t>8/29/2018</a:t>
             </a:fld>
             <a:endParaRPr lang="en-US"/>
           </a:p>
@@ -1403,7 +1403,7 @@
           <a:p>
             <a:fld id="{9D1BA642-AC89-4F3E-BA2B-F8B26D5631CC}" type="datetimeFigureOut">
               <a:rPr lang="en-US" smtClean="0"/>
-              <a:t>8/15/2018</a:t>
+              <a:t>8/29/2018</a:t>
             </a:fld>
             <a:endParaRPr lang="en-US"/>
           </a:p>
@@ -1815,7 +1815,7 @@
           <a:p>
             <a:fld id="{9D1BA642-AC89-4F3E-BA2B-F8B26D5631CC}" type="datetimeFigureOut">
               <a:rPr lang="en-US" smtClean="0"/>
-              <a:t>8/15/2018</a:t>
+              <a:t>8/29/2018</a:t>
             </a:fld>
             <a:endParaRPr lang="en-US"/>
           </a:p>
@@ -1956,7 +1956,7 @@
           <a:p>
             <a:fld id="{9D1BA642-AC89-4F3E-BA2B-F8B26D5631CC}" type="datetimeFigureOut">
               <a:rPr lang="en-US" smtClean="0"/>
-              <a:t>8/15/2018</a:t>
+              <a:t>8/29/2018</a:t>
             </a:fld>
             <a:endParaRPr lang="en-US"/>
           </a:p>
@@ -2069,7 +2069,7 @@
           <a:p>
             <a:fld id="{9D1BA642-AC89-4F3E-BA2B-F8B26D5631CC}" type="datetimeFigureOut">
               <a:rPr lang="en-US" smtClean="0"/>
-              <a:t>8/15/2018</a:t>
+              <a:t>8/29/2018</a:t>
             </a:fld>
             <a:endParaRPr lang="en-US"/>
           </a:p>
@@ -2380,7 +2380,7 @@
           <a:p>
             <a:fld id="{9D1BA642-AC89-4F3E-BA2B-F8B26D5631CC}" type="datetimeFigureOut">
               <a:rPr lang="en-US" smtClean="0"/>
-              <a:t>8/15/2018</a:t>
+              <a:t>8/29/2018</a:t>
             </a:fld>
             <a:endParaRPr lang="en-US"/>
           </a:p>
@@ -2668,7 +2668,7 @@
           <a:p>
             <a:fld id="{9D1BA642-AC89-4F3E-BA2B-F8B26D5631CC}" type="datetimeFigureOut">
               <a:rPr lang="en-US" smtClean="0"/>
-              <a:t>8/15/2018</a:t>
+              <a:t>8/29/2018</a:t>
             </a:fld>
             <a:endParaRPr lang="en-US"/>
           </a:p>
@@ -2909,7 +2909,7 @@
           <a:p>
             <a:fld id="{9D1BA642-AC89-4F3E-BA2B-F8B26D5631CC}" type="datetimeFigureOut">
               <a:rPr lang="en-US" smtClean="0"/>
-              <a:t>8/15/2018</a:t>
+              <a:t>8/29/2018</a:t>
             </a:fld>
             <a:endParaRPr lang="en-US"/>
           </a:p>
@@ -3356,9 +3356,10 @@
           <a:p>
             <a:pPr algn="ctr"/>
             <a:r>
-              <a:rPr lang="en-US" sz="2000" dirty="0"/>
-              <a:t>In-memory buffer</a:t>
-            </a:r>
+              <a:rPr lang="en-US" sz="2000"/>
+              <a:t>In-memory Buffer</a:t>
+            </a:r>
+            <a:endParaRPr lang="en-US" sz="2000" dirty="0"/>
           </a:p>
         </p:txBody>
       </p:sp>
@@ -5645,8 +5646,8 @@
         </p:nvSpPr>
         <p:spPr>
           <a:xfrm>
-            <a:off x="6302946" y="5507017"/>
-            <a:ext cx="2270365" cy="400110"/>
+            <a:off x="6303747" y="5507017"/>
+            <a:ext cx="2268763" cy="400110"/>
           </a:xfrm>
           <a:prstGeom prst="rect">
             <a:avLst/>
@@ -5661,7 +5662,7 @@
             <a:pPr algn="ctr"/>
             <a:r>
               <a:rPr lang="en-US" sz="2000" dirty="0"/>
-              <a:t>Message processing</a:t>
+              <a:t>Message Processing</a:t>
             </a:r>
           </a:p>
         </p:txBody>

</xml_diff>